<commit_message>
Add GPIO io manager and config file
</commit_message>
<xml_diff>
--- a/Alarma Diagrama conceptual.pptx
+++ b/Alarma Diagrama conceptual.pptx
@@ -6,7 +6,8 @@
   </p:sldMasterIdLst>
   <p:sldIdLst>
     <p:sldId id="256" r:id="rId2"/>
-    <p:sldId id="257" r:id="rId3"/>
+    <p:sldId id="258" r:id="rId3"/>
+    <p:sldId id="257" r:id="rId4"/>
   </p:sldIdLst>
   <p:sldSz cx="12192000" cy="6858000"/>
   <p:notesSz cx="6858000" cy="9144000"/>
@@ -105,6 +106,11 @@
       </a:defRPr>
     </a:lvl9pPr>
   </p:defaultTextStyle>
+  <p:extLst>
+    <p:ext uri="{EFAFB233-063F-42B5-8137-9DF3F51BA10A}">
+      <p15:sldGuideLst xmlns:p15="http://schemas.microsoft.com/office/powerpoint/2012/main"/>
+    </p:ext>
+  </p:extLst>
 </p:presentation>
 </file>
 
@@ -239,7 +245,7 @@
           <a:p>
             <a:fld id="{57C27236-0A77-4F5F-8891-E72726C50FC1}" type="datetimeFigureOut">
               <a:rPr lang="es-MX" smtClean="0"/>
-              <a:t>09/01/2026</a:t>
+              <a:t>15/01/2026</a:t>
             </a:fld>
             <a:endParaRPr lang="es-MX"/>
           </a:p>
@@ -409,7 +415,7 @@
           <a:p>
             <a:fld id="{57C27236-0A77-4F5F-8891-E72726C50FC1}" type="datetimeFigureOut">
               <a:rPr lang="es-MX" smtClean="0"/>
-              <a:t>09/01/2026</a:t>
+              <a:t>15/01/2026</a:t>
             </a:fld>
             <a:endParaRPr lang="es-MX"/>
           </a:p>
@@ -589,7 +595,7 @@
           <a:p>
             <a:fld id="{57C27236-0A77-4F5F-8891-E72726C50FC1}" type="datetimeFigureOut">
               <a:rPr lang="es-MX" smtClean="0"/>
-              <a:t>09/01/2026</a:t>
+              <a:t>15/01/2026</a:t>
             </a:fld>
             <a:endParaRPr lang="es-MX"/>
           </a:p>
@@ -759,7 +765,7 @@
           <a:p>
             <a:fld id="{57C27236-0A77-4F5F-8891-E72726C50FC1}" type="datetimeFigureOut">
               <a:rPr lang="es-MX" smtClean="0"/>
-              <a:t>09/01/2026</a:t>
+              <a:t>15/01/2026</a:t>
             </a:fld>
             <a:endParaRPr lang="es-MX"/>
           </a:p>
@@ -1005,7 +1011,7 @@
           <a:p>
             <a:fld id="{57C27236-0A77-4F5F-8891-E72726C50FC1}" type="datetimeFigureOut">
               <a:rPr lang="es-MX" smtClean="0"/>
-              <a:t>09/01/2026</a:t>
+              <a:t>15/01/2026</a:t>
             </a:fld>
             <a:endParaRPr lang="es-MX"/>
           </a:p>
@@ -1237,7 +1243,7 @@
           <a:p>
             <a:fld id="{57C27236-0A77-4F5F-8891-E72726C50FC1}" type="datetimeFigureOut">
               <a:rPr lang="es-MX" smtClean="0"/>
-              <a:t>09/01/2026</a:t>
+              <a:t>15/01/2026</a:t>
             </a:fld>
             <a:endParaRPr lang="es-MX"/>
           </a:p>
@@ -1604,7 +1610,7 @@
           <a:p>
             <a:fld id="{57C27236-0A77-4F5F-8891-E72726C50FC1}" type="datetimeFigureOut">
               <a:rPr lang="es-MX" smtClean="0"/>
-              <a:t>09/01/2026</a:t>
+              <a:t>15/01/2026</a:t>
             </a:fld>
             <a:endParaRPr lang="es-MX"/>
           </a:p>
@@ -1722,7 +1728,7 @@
           <a:p>
             <a:fld id="{57C27236-0A77-4F5F-8891-E72726C50FC1}" type="datetimeFigureOut">
               <a:rPr lang="es-MX" smtClean="0"/>
-              <a:t>09/01/2026</a:t>
+              <a:t>15/01/2026</a:t>
             </a:fld>
             <a:endParaRPr lang="es-MX"/>
           </a:p>
@@ -1817,7 +1823,7 @@
           <a:p>
             <a:fld id="{57C27236-0A77-4F5F-8891-E72726C50FC1}" type="datetimeFigureOut">
               <a:rPr lang="es-MX" smtClean="0"/>
-              <a:t>09/01/2026</a:t>
+              <a:t>15/01/2026</a:t>
             </a:fld>
             <a:endParaRPr lang="es-MX"/>
           </a:p>
@@ -2094,7 +2100,7 @@
           <a:p>
             <a:fld id="{57C27236-0A77-4F5F-8891-E72726C50FC1}" type="datetimeFigureOut">
               <a:rPr lang="es-MX" smtClean="0"/>
-              <a:t>09/01/2026</a:t>
+              <a:t>15/01/2026</a:t>
             </a:fld>
             <a:endParaRPr lang="es-MX"/>
           </a:p>
@@ -2351,7 +2357,7 @@
           <a:p>
             <a:fld id="{57C27236-0A77-4F5F-8891-E72726C50FC1}" type="datetimeFigureOut">
               <a:rPr lang="es-MX" smtClean="0"/>
-              <a:t>09/01/2026</a:t>
+              <a:t>15/01/2026</a:t>
             </a:fld>
             <a:endParaRPr lang="es-MX"/>
           </a:p>
@@ -2564,7 +2570,7 @@
           <a:p>
             <a:fld id="{57C27236-0A77-4F5F-8891-E72726C50FC1}" type="datetimeFigureOut">
               <a:rPr lang="es-MX" smtClean="0"/>
-              <a:t>09/01/2026</a:t>
+              <a:t>15/01/2026</a:t>
             </a:fld>
             <a:endParaRPr lang="es-MX"/>
           </a:p>
@@ -4828,6 +4834,118 @@
           <p:cNvPr id="2" name="Título 1">
             <a:extLst>
               <a:ext uri="{FF2B5EF4-FFF2-40B4-BE49-F238E27FC236}">
+                <a16:creationId xmlns:a16="http://schemas.microsoft.com/office/drawing/2014/main" id="{9092486A-CE67-A341-D70D-ADBA685627D6}"/>
+              </a:ext>
+            </a:extLst>
+          </p:cNvPr>
+          <p:cNvSpPr>
+            <a:spLocks noGrp="1"/>
+          </p:cNvSpPr>
+          <p:nvPr>
+            <p:ph type="title"/>
+          </p:nvPr>
+        </p:nvSpPr>
+        <p:spPr/>
+        <p:txBody>
+          <a:bodyPr/>
+          <a:lstStyle/>
+          <a:p>
+            <a:r>
+              <a:rPr lang="es-MX" dirty="0"/>
+              <a:t>File </a:t>
+            </a:r>
+            <a:r>
+              <a:rPr lang="es-MX" dirty="0" err="1"/>
+              <a:t>structure</a:t>
+            </a:r>
+            <a:endParaRPr lang="es-MX" dirty="0"/>
+          </a:p>
+        </p:txBody>
+      </p:sp>
+      <p:sp>
+        <p:nvSpPr>
+          <p:cNvPr id="3" name="Marcador de contenido 2">
+            <a:extLst>
+              <a:ext uri="{FF2B5EF4-FFF2-40B4-BE49-F238E27FC236}">
+                <a16:creationId xmlns:a16="http://schemas.microsoft.com/office/drawing/2014/main" id="{EDD7103B-1001-95EB-1FFA-FE3A28754FAE}"/>
+              </a:ext>
+            </a:extLst>
+          </p:cNvPr>
+          <p:cNvSpPr>
+            <a:spLocks noGrp="1"/>
+          </p:cNvSpPr>
+          <p:nvPr>
+            <p:ph idx="1"/>
+          </p:nvPr>
+        </p:nvSpPr>
+        <p:spPr/>
+        <p:txBody>
+          <a:bodyPr/>
+          <a:lstStyle/>
+          <a:p>
+            <a:r>
+              <a:rPr lang="es-MX" dirty="0"/>
+              <a:t>core.py</a:t>
+            </a:r>
+          </a:p>
+          <a:p>
+            <a:r>
+              <a:rPr lang="es-MX" dirty="0"/>
+              <a:t>gui.py</a:t>
+            </a:r>
+          </a:p>
+          <a:p>
+            <a:r>
+              <a:rPr lang="es-MX" dirty="0"/>
+              <a:t>io_manager.py</a:t>
+            </a:r>
+          </a:p>
+          <a:p>
+            <a:r>
+              <a:rPr lang="es-MX" dirty="0"/>
+              <a:t>config.py</a:t>
+            </a:r>
+          </a:p>
+          <a:p>
+            <a:endParaRPr lang="es-MX" dirty="0"/>
+          </a:p>
+        </p:txBody>
+      </p:sp>
+    </p:spTree>
+    <p:extLst>
+      <p:ext uri="{BB962C8B-B14F-4D97-AF65-F5344CB8AC3E}">
+        <p14:creationId xmlns:p14="http://schemas.microsoft.com/office/powerpoint/2010/main" val="157656779"/>
+      </p:ext>
+    </p:extLst>
+  </p:cSld>
+  <p:clrMapOvr>
+    <a:masterClrMapping/>
+  </p:clrMapOvr>
+</p:sld>
+</file>
+
+<file path=ppt/slides/slide3.xml><?xml version="1.0" encoding="utf-8"?>
+<p:sld xmlns:a="http://schemas.openxmlformats.org/drawingml/2006/main" xmlns:r="http://schemas.openxmlformats.org/officeDocument/2006/relationships" xmlns:p="http://schemas.openxmlformats.org/presentationml/2006/main">
+  <p:cSld>
+    <p:spTree>
+      <p:nvGrpSpPr>
+        <p:cNvPr id="1" name=""/>
+        <p:cNvGrpSpPr/>
+        <p:nvPr/>
+      </p:nvGrpSpPr>
+      <p:grpSpPr>
+        <a:xfrm>
+          <a:off x="0" y="0"/>
+          <a:ext cx="0" cy="0"/>
+          <a:chOff x="0" y="0"/>
+          <a:chExt cx="0" cy="0"/>
+        </a:xfrm>
+      </p:grpSpPr>
+      <p:sp>
+        <p:nvSpPr>
+          <p:cNvPr id="2" name="Título 1">
+            <a:extLst>
+              <a:ext uri="{FF2B5EF4-FFF2-40B4-BE49-F238E27FC236}">
                 <a16:creationId xmlns:a16="http://schemas.microsoft.com/office/drawing/2014/main" id="{B6E74F91-C133-8E0D-BF36-A28500C0A24F}"/>
               </a:ext>
             </a:extLst>
@@ -4878,12 +4996,9 @@
             </a:r>
           </a:p>
           <a:p>
-            <a:r>
-              <a:rPr lang="es-MX" dirty="0"/>
-              <a:t>core.log</a:t>
-            </a:r>
-          </a:p>
-          <a:p>
+            <a:pPr marL="0" indent="0">
+              <a:buNone/>
+            </a:pPr>
             <a:endParaRPr lang="es-MX" dirty="0"/>
           </a:p>
         </p:txBody>

</xml_diff>